<commit_message>
Removed all unwanted files
</commit_message>
<xml_diff>
--- a/final-ppt.pptx
+++ b/final-ppt.pptx
@@ -3459,7 +3459,7 @@
           <a:p>
             <a:fld id="{1160EA64-D806-43AC-9DF2-F8C432F32B4C}" type="datetimeFigureOut">
               <a:rPr lang="en-US" dirty="0"/>
-              <a:t>4/10/19</a:t>
+              <a:t>4/11/19</a:t>
             </a:fld>
             <a:endParaRPr lang="en-US" dirty="0"/>
           </a:p>
@@ -3625,7 +3625,7 @@
           <a:p>
             <a:fld id="{E9F9C37B-1D36-470B-8223-D6C91242EC14}" type="datetimeFigureOut">
               <a:rPr lang="en-US" dirty="0"/>
-              <a:t>4/10/19</a:t>
+              <a:t>4/11/19</a:t>
             </a:fld>
             <a:endParaRPr lang="en-US" dirty="0"/>
           </a:p>
@@ -3800,7 +3800,7 @@
           <a:p>
             <a:fld id="{67C6F52A-A82B-47A2-A83A-8C4C91F2D59F}" type="datetimeFigureOut">
               <a:rPr lang="en-US" dirty="0"/>
-              <a:t>4/10/19</a:t>
+              <a:t>4/11/19</a:t>
             </a:fld>
             <a:endParaRPr lang="en-US" dirty="0"/>
           </a:p>
@@ -3965,7 +3965,7 @@
           <a:p>
             <a:fld id="{F070A7B3-6521-4DCA-87E5-044747A908C1}" type="datetimeFigureOut">
               <a:rPr lang="en-US" dirty="0"/>
-              <a:t>4/10/19</a:t>
+              <a:t>4/11/19</a:t>
             </a:fld>
             <a:endParaRPr lang="en-US" dirty="0"/>
           </a:p>
@@ -4229,7 +4229,7 @@
           <a:p>
             <a:fld id="{1160EA64-D806-43AC-9DF2-F8C432F32B4C}" type="datetimeFigureOut">
               <a:rPr lang="en-US" dirty="0"/>
-              <a:t>4/10/19</a:t>
+              <a:t>4/11/19</a:t>
             </a:fld>
             <a:endParaRPr lang="en-US" dirty="0"/>
           </a:p>
@@ -4457,7 +4457,7 @@
           <a:p>
             <a:fld id="{AB134690-1557-4C89-A502-4959FE7FAD70}" type="datetimeFigureOut">
               <a:rPr lang="en-US" dirty="0"/>
-              <a:t>4/10/19</a:t>
+              <a:t>4/11/19</a:t>
             </a:fld>
             <a:endParaRPr lang="en-US" dirty="0"/>
           </a:p>
@@ -4811,7 +4811,7 @@
           <a:p>
             <a:fld id="{4F7D4976-E339-4826-83B7-FBD03F55ECF8}" type="datetimeFigureOut">
               <a:rPr lang="en-US" dirty="0"/>
-              <a:t>4/10/19</a:t>
+              <a:t>4/11/19</a:t>
             </a:fld>
             <a:endParaRPr lang="en-US" dirty="0"/>
           </a:p>
@@ -4947,7 +4947,7 @@
           <a:p>
             <a:fld id="{E1037C31-9E7A-4F99-8774-A0E530DE1A42}" type="datetimeFigureOut">
               <a:rPr lang="en-US" dirty="0"/>
-              <a:t>4/10/19</a:t>
+              <a:t>4/11/19</a:t>
             </a:fld>
             <a:endParaRPr lang="en-US" dirty="0"/>
           </a:p>
@@ -5037,7 +5037,7 @@
           <a:p>
             <a:fld id="{C278504F-A551-4DE0-9316-4DCD1D8CC752}" type="datetimeFigureOut">
               <a:rPr lang="en-US" dirty="0"/>
-              <a:t>4/10/19</a:t>
+              <a:t>4/11/19</a:t>
             </a:fld>
             <a:endParaRPr lang="en-US" dirty="0"/>
           </a:p>
@@ -5389,7 +5389,7 @@
           <a:p>
             <a:fld id="{D1BE4249-C0D0-4B06-8692-E8BB871AF643}" type="datetimeFigureOut">
               <a:rPr lang="en-US" dirty="0"/>
-              <a:t>4/10/19</a:t>
+              <a:t>4/11/19</a:t>
             </a:fld>
             <a:endParaRPr lang="en-US" dirty="0"/>
           </a:p>
@@ -5741,7 +5741,7 @@
           <a:p>
             <a:fld id="{042B0DB6-F5C7-45FB-8CF3-31B45F9C2DAC}" type="datetimeFigureOut">
               <a:rPr lang="en-US" dirty="0"/>
-              <a:t>4/10/19</a:t>
+              <a:t>4/11/19</a:t>
             </a:fld>
             <a:endParaRPr lang="en-US" dirty="0"/>
           </a:p>
@@ -5977,7 +5977,7 @@
           <a:p>
             <a:fld id="{1160EA64-D806-43AC-9DF2-F8C432F32B4C}" type="datetimeFigureOut">
               <a:rPr lang="en-US" dirty="0"/>
-              <a:t>4/10/19</a:t>
+              <a:t>4/11/19</a:t>
             </a:fld>
             <a:endParaRPr lang="en-US" dirty="0"/>
           </a:p>
@@ -7826,7 +7826,7 @@
             <p:ph idx="1"/>
             <p:extLst>
               <p:ext uri="{D42A27DB-BD31-4B8C-83A1-F6EECF244321}">
-                <p14:modId xmlns:p14="http://schemas.microsoft.com/office/powerpoint/2010/main" val="1632804673"/>
+                <p14:modId xmlns:p14="http://schemas.microsoft.com/office/powerpoint/2010/main" val="350013130"/>
               </p:ext>
             </p:extLst>
           </p:nvPr>
@@ -7954,7 +7954,7 @@
                       <a:pPr algn="ctr"/>
                       <a:r>
                         <a:rPr lang="en-US" dirty="0"/>
-                        <a:t>330</a:t>
+                        <a:t>315</a:t>
                       </a:r>
                     </a:p>
                   </a:txBody>
@@ -7968,7 +7968,7 @@
                       <a:pPr algn="ctr"/>
                       <a:r>
                         <a:rPr lang="en-US" dirty="0"/>
-                        <a:t>470</a:t>
+                        <a:t>280</a:t>
                       </a:r>
                     </a:p>
                   </a:txBody>
@@ -7982,7 +7982,7 @@
                       <a:pPr algn="ctr"/>
                       <a:r>
                         <a:rPr lang="en-US" dirty="0"/>
-                        <a:t>200</a:t>
+                        <a:t>405</a:t>
                       </a:r>
                     </a:p>
                   </a:txBody>
@@ -8017,7 +8017,7 @@
                       <a:pPr algn="ctr"/>
                       <a:r>
                         <a:rPr lang="en-US" dirty="0"/>
-                        <a:t>350</a:t>
+                        <a:t>390</a:t>
                       </a:r>
                     </a:p>
                   </a:txBody>
@@ -8031,7 +8031,7 @@
                       <a:pPr algn="ctr"/>
                       <a:r>
                         <a:rPr lang="en-US" dirty="0"/>
-                        <a:t>450</a:t>
+                        <a:t>275</a:t>
                       </a:r>
                     </a:p>
                   </a:txBody>
@@ -8045,7 +8045,7 @@
                       <a:pPr algn="ctr"/>
                       <a:r>
                         <a:rPr lang="en-US" dirty="0"/>
-                        <a:t>200</a:t>
+                        <a:t>335</a:t>
                       </a:r>
                     </a:p>
                   </a:txBody>
@@ -8080,7 +8080,7 @@
                       <a:pPr algn="ctr"/>
                       <a:r>
                         <a:rPr lang="en-US" dirty="0"/>
-                        <a:t>225</a:t>
+                        <a:t>275</a:t>
                       </a:r>
                     </a:p>
                   </a:txBody>
@@ -8094,7 +8094,7 @@
                       <a:pPr algn="ctr"/>
                       <a:r>
                         <a:rPr lang="en-US" dirty="0"/>
-                        <a:t>375</a:t>
+                        <a:t>410</a:t>
                       </a:r>
                     </a:p>
                   </a:txBody>
@@ -8107,9 +8107,10 @@
                     <a:p>
                       <a:pPr algn="ctr"/>
                       <a:r>
-                        <a:rPr lang="en-US" dirty="0"/>
-                        <a:t>400</a:t>
+                        <a:rPr lang="en-US"/>
+                        <a:t>315</a:t>
                       </a:r>
+                      <a:endParaRPr lang="en-US" dirty="0"/>
                     </a:p>
                   </a:txBody>
                   <a:tcPr/>

</xml_diff>